<commit_message>
correct typo on exercise 4
</commit_message>
<xml_diff>
--- a/files/quant-data-vis/Quantitative_Data_Visualisation.pptx
+++ b/files/quant-data-vis/Quantitative_Data_Visualisation.pptx
@@ -16845,12 +16845,8 @@
               <a:buNone/>
             </a:pPr>
             <a:r>
-              <a:rPr lang="en-GB" dirty="0" smtClean="0"/>
-              <a:t>ggplot2 </a:t>
-            </a:r>
-            <a:r>
               <a:rPr lang="en-GB" dirty="0"/>
-              <a:t>syntax</a:t>
+              <a:t>ggplot2 syntax</a:t>
             </a:r>
             <a:endParaRPr dirty="0"/>
           </a:p>
@@ -17301,12 +17297,8 @@
               <a:buNone/>
             </a:pPr>
             <a:r>
-              <a:rPr lang="en-GB" dirty="0" smtClean="0"/>
-              <a:t>ggplot2 </a:t>
-            </a:r>
-            <a:r>
               <a:rPr lang="en-GB" dirty="0"/>
-              <a:t>syntax</a:t>
+              <a:t>ggplot2 syntax</a:t>
             </a:r>
             <a:endParaRPr dirty="0"/>
           </a:p>
@@ -24976,10 +24968,10 @@
               <a:buNone/>
             </a:pPr>
             <a:r>
-              <a:rPr lang="en-GB"/>
-              <a:t>Task 5 – Does Age interact with Music Taste?</a:t>
-            </a:r>
-            <a:endParaRPr/>
+              <a:rPr lang="en-GB" dirty="0"/>
+              <a:t>Task 5 – Does Age interact with Breakfast Habits?</a:t>
+            </a:r>
+            <a:endParaRPr dirty="0"/>
           </a:p>
         </p:txBody>
       </p:sp>

</xml_diff>